<commit_message>
Update defense slide template
</commit_message>
<xml_diff>
--- a/slides/Template_SETI_B2.pptx
+++ b/slides/Template_SETI_B2.pptx
@@ -13,8 +13,8 @@
   <p:sldIdLst>
     <p:sldId id="442" r:id="rId2"/>
     <p:sldId id="350" r:id="rId3"/>
-    <p:sldId id="443" r:id="rId4"/>
-    <p:sldId id="444" r:id="rId5"/>
+    <p:sldId id="444" r:id="rId4"/>
+    <p:sldId id="443" r:id="rId5"/>
     <p:sldId id="295" r:id="rId6"/>
   </p:sldIdLst>
   <p:sldSz cx="12192000" cy="6858000"/>
@@ -4021,7 +4021,6 @@
               <a:rPr lang="en-CA" altLang="fr-FR" sz="1400" dirty="0" smtClean="0"/>
               <a:t>Please keep it short…</a:t>
             </a:r>
-            <a:endParaRPr lang="en-CA" altLang="fr-FR" sz="1400" dirty="0" smtClean="0"/>
           </a:p>
           <a:p>
             <a:r>
@@ -4375,140 +4374,86 @@
             <p:ph sz="quarter" idx="18"/>
           </p:nvPr>
         </p:nvSpPr>
-        <p:spPr>
-          <a:xfrm>
-            <a:off x="479001" y="1257300"/>
-            <a:ext cx="11232000" cy="5268044"/>
-          </a:xfrm>
-        </p:spPr>
+        <p:spPr/>
         <p:txBody>
           <a:bodyPr/>
           <a:lstStyle/>
           <a:p>
             <a:r>
               <a:rPr lang="en-US" dirty="0" smtClean="0"/>
-              <a:t>Prioritize explaining your thought process and the “big picture” instead of doing a syntactical description of your models.</a:t>
+              <a:t>The minimum content is a checklist and not a plan for your talk. You are free to follow it as a plan or adjust it for your own talk. You can add new content if you want.</a:t>
+            </a:r>
+          </a:p>
+          <a:p>
+            <a:r>
+              <a:rPr lang="en-US" dirty="0" smtClean="0"/>
+              <a:t>Diagrams </a:t>
+            </a:r>
+            <a:r>
+              <a:rPr lang="en-US" dirty="0"/>
+              <a:t>can be inserted in slides as screenshots or exported PNG from Papyrus. </a:t>
+            </a:r>
+            <a:r>
+              <a:rPr lang="en-US" dirty="0" smtClean="0"/>
+              <a:t>Diagrams must be well drawn and understandable.</a:t>
             </a:r>
           </a:p>
           <a:p>
             <a:pPr lvl="1"/>
             <a:r>
               <a:rPr lang="en-US" dirty="0" smtClean="0"/>
-              <a:t>Bad examples:</a:t>
-            </a:r>
-          </a:p>
-          <a:p>
-            <a:pPr lvl="2"/>
-            <a:r>
-              <a:rPr lang="en-CA" altLang="fr-FR" dirty="0" smtClean="0"/>
-              <a:t>There </a:t>
-            </a:r>
-            <a:r>
-              <a:rPr lang="en-CA" altLang="fr-FR" dirty="0"/>
-              <a:t>is requirement called </a:t>
-            </a:r>
-            <a:r>
-              <a:rPr lang="en-CA" altLang="fr-FR" dirty="0" smtClean="0"/>
-              <a:t>Requirement 1 </a:t>
-            </a:r>
-            <a:r>
-              <a:rPr lang="en-CA" altLang="fr-FR" dirty="0"/>
-              <a:t>with id </a:t>
-            </a:r>
-            <a:r>
-              <a:rPr lang="en-CA" altLang="fr-FR" dirty="0" smtClean="0"/>
-              <a:t>REQ01 </a:t>
-            </a:r>
-            <a:r>
-              <a:rPr lang="en-CA" altLang="fr-FR" dirty="0"/>
-              <a:t>and text </a:t>
-            </a:r>
-            <a:r>
-              <a:rPr lang="en-CA" altLang="fr-FR" dirty="0" smtClean="0"/>
-              <a:t>[…]</a:t>
-            </a:r>
-          </a:p>
-          <a:p>
-            <a:pPr lvl="2"/>
-            <a:r>
-              <a:rPr lang="en-CA" altLang="fr-FR" dirty="0" smtClean="0"/>
-              <a:t>There is a message called Msg1. It has 3 attributes called attr1, attr2, and attr3.</a:t>
-            </a:r>
-          </a:p>
-          <a:p>
-            <a:pPr lvl="2"/>
-            <a:r>
-              <a:rPr lang="en-CA" altLang="fr-FR" dirty="0" smtClean="0"/>
-              <a:t>In the system model, we have Instance 1 with Port 1 connected to Instance 2 with Port 2.</a:t>
-            </a:r>
-          </a:p>
-          <a:p>
-            <a:pPr lvl="2"/>
-            <a:r>
-              <a:rPr lang="en-CA" altLang="fr-FR" dirty="0" smtClean="0"/>
-              <a:t>We clicked on the button ‘Generate ROS code’ and it generated code for us after we clicked on several other menus.</a:t>
-            </a:r>
-          </a:p>
-          <a:p>
-            <a:pPr lvl="2"/>
-            <a:r>
-              <a:rPr lang="en-CA" altLang="fr-FR" dirty="0"/>
-              <a:t>There is one fallback node, connected to one sequence node and one action node</a:t>
-            </a:r>
-            <a:r>
-              <a:rPr lang="en-CA" altLang="fr-FR" dirty="0" smtClean="0"/>
+              <a:t>Good examples: Rectilinear edges, no overwhelming labels, aligned nodes, no superposition.</a:t>
+            </a:r>
+          </a:p>
+          <a:p>
+            <a:r>
+              <a:rPr lang="en-US" dirty="0" smtClean="0"/>
+              <a:t>Teams handle the time of each part of their presentation as they wish but no part should be excessively longer than the others.</a:t>
+            </a:r>
+          </a:p>
+          <a:p>
+            <a:pPr lvl="1"/>
+            <a:r>
+              <a:rPr lang="en-US" dirty="0" smtClean="0"/>
+              <a:t>Bad example: Requirements part takes 15 minutes.</a:t>
+            </a:r>
+          </a:p>
+          <a:p>
+            <a:r>
+              <a:rPr lang="en-US" dirty="0" smtClean="0"/>
+              <a:t>Better to do a short presentation that’s interesting than a long presentation that’s boring.</a:t>
+            </a:r>
+          </a:p>
+          <a:p>
+            <a:pPr lvl="1"/>
+            <a:r>
+              <a:rPr lang="en-US" dirty="0" smtClean="0"/>
+              <a:t>Bad examples: See bad examples in </a:t>
+            </a:r>
+            <a:r>
+              <a:rPr lang="en-US" dirty="0" smtClean="0"/>
+              <a:t>next </a:t>
+            </a:r>
+            <a:r>
+              <a:rPr lang="en-US" dirty="0" smtClean="0"/>
+              <a:t>slide.</a:t>
+            </a:r>
+          </a:p>
+          <a:p>
+            <a:r>
+              <a:rPr lang="en-US" dirty="0" smtClean="0"/>
+              <a:t>Every team member should participate in the talk</a:t>
+            </a:r>
+            <a:r>
+              <a:rPr lang="en-US" dirty="0" smtClean="0"/>
               <a:t>.</a:t>
             </a:r>
-          </a:p>
-          <a:p>
-            <a:pPr lvl="2"/>
-            <a:r>
-              <a:rPr lang="en-CA" altLang="fr-FR" dirty="0" smtClean="0"/>
-              <a:t>In </a:t>
-            </a:r>
-            <a:r>
-              <a:rPr lang="en-CA" altLang="fr-FR" dirty="0"/>
-              <a:t>the Hazard Event cell, it is </a:t>
-            </a:r>
-            <a:r>
-              <a:rPr lang="en-CA" altLang="fr-FR" dirty="0" smtClean="0"/>
-              <a:t>written ‘The event that causes the hazard is […]’. In the Frequency cell it is written ‘2’.</a:t>
-            </a:r>
-          </a:p>
-          <a:p>
-            <a:pPr lvl="1"/>
-            <a:r>
-              <a:rPr lang="en-CA" altLang="fr-FR" dirty="0" smtClean="0"/>
-              <a:t>Good examples:</a:t>
-            </a:r>
-          </a:p>
-          <a:p>
-            <a:pPr lvl="2"/>
-            <a:r>
-              <a:rPr lang="en-CA" altLang="fr-FR" dirty="0" smtClean="0"/>
-              <a:t>We modeled a behavior to make the vehicle stop upon detection of several objects, like obstacles, pedestrians, and lack of road. We had some difficulty modeling the AI behavior with a BT because in Papyrus there’s not decorator node. Our solution was to […]. The whole approach of modeling a behavior as a tree is new to us and unnatural.</a:t>
-            </a:r>
-          </a:p>
-          <a:p>
-            <a:pPr lvl="2"/>
-            <a:r>
-              <a:rPr lang="en-CA" altLang="fr-FR" dirty="0" smtClean="0"/>
-              <a:t>We had some integration issues during system modeling because we didn’t expect the same interfaces provided by the other teams. As domain experts, we would have preferred […].</a:t>
-            </a:r>
-          </a:p>
-          <a:p>
-            <a:pPr lvl="2"/>
-            <a:r>
-              <a:rPr lang="en-CA" altLang="fr-FR" dirty="0" smtClean="0"/>
-              <a:t>The ISO standard didn’t help us identify hazards with a go-to method. Instead, this is how we identified our hazards […]. Also, we found a quantification of risks by numbers too restricting, which limited our creativity in risk assessment.</a:t>
-            </a:r>
-          </a:p>
-          <a:p>
-            <a:pPr lvl="1"/>
-            <a:endParaRPr lang="en-CA" altLang="fr-FR" dirty="0" smtClean="0"/>
-          </a:p>
-          <a:p>
-            <a:pPr lvl="1"/>
+            <a:endParaRPr lang="en-US" dirty="0" smtClean="0"/>
+          </a:p>
+          <a:p>
+            <a:endParaRPr lang="en-US" dirty="0" smtClean="0"/>
+          </a:p>
+          <a:p>
             <a:endParaRPr lang="en-US" dirty="0"/>
           </a:p>
         </p:txBody>
@@ -4539,7 +4484,7 @@
     </p:spTree>
     <p:extLst>
       <p:ext uri="{BB962C8B-B14F-4D97-AF65-F5344CB8AC3E}">
-        <p14:creationId xmlns:p14="http://schemas.microsoft.com/office/powerpoint/2010/main" val="2039403683"/>
+        <p14:creationId xmlns:p14="http://schemas.microsoft.com/office/powerpoint/2010/main" val="1900175594"/>
       </p:ext>
     </p:extLst>
   </p:cSld>
@@ -4576,63 +4521,152 @@
             <p:ph sz="quarter" idx="18"/>
           </p:nvPr>
         </p:nvSpPr>
-        <p:spPr/>
+        <p:spPr>
+          <a:xfrm>
+            <a:off x="479001" y="1257300"/>
+            <a:ext cx="11232000" cy="5268044"/>
+          </a:xfrm>
+        </p:spPr>
         <p:txBody>
           <a:bodyPr/>
           <a:lstStyle/>
           <a:p>
             <a:r>
-              <a:rPr lang="en-US" dirty="0"/>
-              <a:t>Diagrams can be inserted in slides as screenshots or exported PNG from Papyrus. </a:t>
-            </a:r>
-            <a:r>
               <a:rPr lang="en-US" dirty="0" smtClean="0"/>
-              <a:t>Diagrams must be well drawn and understandable.</a:t>
+              <a:t>Prioritize explaining your thought process and </a:t>
+            </a:r>
+            <a:r>
+              <a:rPr lang="en-US" smtClean="0"/>
+              <a:t>the </a:t>
+            </a:r>
+            <a:r>
+              <a:rPr lang="en-US" smtClean="0"/>
+              <a:t>abstract “big </a:t>
+            </a:r>
+            <a:r>
+              <a:rPr lang="en-US" dirty="0" smtClean="0"/>
+              <a:t>picture” instead of doing a syntactical description of your models.</a:t>
             </a:r>
           </a:p>
           <a:p>
             <a:pPr lvl="1"/>
             <a:r>
               <a:rPr lang="en-US" dirty="0" smtClean="0"/>
-              <a:t>Good examples: Rectilinear edges, no overwhelming labels, aligned nodes, no superposition.</a:t>
-            </a:r>
-          </a:p>
-          <a:p>
-            <a:r>
-              <a:rPr lang="en-US" dirty="0" smtClean="0"/>
-              <a:t>Teams handle the time of each part of their presentation as they wish but no part should be excessively longer than the others.</a:t>
+              <a:t>Bad examples:</a:t>
+            </a:r>
+          </a:p>
+          <a:p>
+            <a:pPr lvl="2"/>
+            <a:r>
+              <a:rPr lang="en-CA" altLang="fr-FR" dirty="0" smtClean="0"/>
+              <a:t>There </a:t>
+            </a:r>
+            <a:r>
+              <a:rPr lang="en-CA" altLang="fr-FR" dirty="0"/>
+              <a:t>is requirement called </a:t>
+            </a:r>
+            <a:r>
+              <a:rPr lang="en-CA" altLang="fr-FR" dirty="0" smtClean="0"/>
+              <a:t>Requirement 1 </a:t>
+            </a:r>
+            <a:r>
+              <a:rPr lang="en-CA" altLang="fr-FR" dirty="0"/>
+              <a:t>with id </a:t>
+            </a:r>
+            <a:r>
+              <a:rPr lang="en-CA" altLang="fr-FR" dirty="0" smtClean="0"/>
+              <a:t>REQ01 </a:t>
+            </a:r>
+            <a:r>
+              <a:rPr lang="en-CA" altLang="fr-FR" dirty="0"/>
+              <a:t>and text </a:t>
+            </a:r>
+            <a:r>
+              <a:rPr lang="en-CA" altLang="fr-FR" dirty="0" smtClean="0"/>
+              <a:t>[…]</a:t>
+            </a:r>
+          </a:p>
+          <a:p>
+            <a:pPr lvl="2"/>
+            <a:r>
+              <a:rPr lang="en-CA" altLang="fr-FR" dirty="0" smtClean="0"/>
+              <a:t>There is a message called Msg1. It has 3 attributes called attr1, attr2, and attr3.</a:t>
+            </a:r>
+          </a:p>
+          <a:p>
+            <a:pPr lvl="2"/>
+            <a:r>
+              <a:rPr lang="en-CA" altLang="fr-FR" dirty="0" smtClean="0"/>
+              <a:t>In the system model, we have Instance 1 with Port 1 connected to Instance 2 with Port 2.</a:t>
+            </a:r>
+          </a:p>
+          <a:p>
+            <a:pPr lvl="2"/>
+            <a:r>
+              <a:rPr lang="en-CA" altLang="fr-FR" dirty="0" smtClean="0"/>
+              <a:t>We clicked on the button ‘Generate ROS code’ and it generated code for us after we clicked on several other menus.</a:t>
+            </a:r>
+          </a:p>
+          <a:p>
+            <a:pPr lvl="2"/>
+            <a:r>
+              <a:rPr lang="en-CA" altLang="fr-FR" dirty="0"/>
+              <a:t>There is one fallback node, connected to one sequence node and one action node</a:t>
+            </a:r>
+            <a:r>
+              <a:rPr lang="en-CA" altLang="fr-FR" dirty="0" smtClean="0"/>
+              <a:t>.</a:t>
+            </a:r>
+          </a:p>
+          <a:p>
+            <a:pPr lvl="2"/>
+            <a:r>
+              <a:rPr lang="en-CA" altLang="fr-FR" dirty="0" smtClean="0"/>
+              <a:t>In </a:t>
+            </a:r>
+            <a:r>
+              <a:rPr lang="en-CA" altLang="fr-FR" dirty="0"/>
+              <a:t>the Hazard Event cell, it is </a:t>
+            </a:r>
+            <a:r>
+              <a:rPr lang="en-CA" altLang="fr-FR" dirty="0" smtClean="0"/>
+              <a:t>written ‘The event that causes the hazard is […]’. In the Frequency cell it is written ‘2’.</a:t>
             </a:r>
           </a:p>
           <a:p>
             <a:pPr lvl="1"/>
             <a:r>
-              <a:rPr lang="en-US" dirty="0" smtClean="0"/>
-              <a:t>Bad example: Requirements part takes 15 minutes.</a:t>
-            </a:r>
-          </a:p>
-          <a:p>
-            <a:r>
-              <a:rPr lang="en-US" dirty="0" smtClean="0"/>
-              <a:t>Better to do a short presentation that’s interesting than a long presentation that’s boring.</a:t>
+              <a:rPr lang="en-CA" altLang="fr-FR" dirty="0" smtClean="0"/>
+              <a:t>Good examples:</a:t>
+            </a:r>
+          </a:p>
+          <a:p>
+            <a:pPr lvl="2"/>
+            <a:r>
+              <a:rPr lang="en-CA" altLang="fr-FR" dirty="0" smtClean="0"/>
+              <a:t>We modeled a behavior to make the vehicle stop upon detection of several objects, like obstacles, pedestrians, and lack of road. We had some difficulty modeling the AI behavior with a BT because in Papyrus there’s not decorator node. Our solution was to […]. The whole approach of modeling a behavior as a tree is new to us and unnatural.</a:t>
+            </a:r>
+          </a:p>
+          <a:p>
+            <a:pPr lvl="2"/>
+            <a:r>
+              <a:rPr lang="en-CA" altLang="fr-FR" dirty="0" smtClean="0"/>
+              <a:t>We had some integration issues during system modeling because we didn’t expect the same interfaces provided by the other teams. As domain experts, we would have preferred […].</a:t>
+            </a:r>
+          </a:p>
+          <a:p>
+            <a:pPr lvl="2"/>
+            <a:r>
+              <a:rPr lang="en-CA" altLang="fr-FR" dirty="0" smtClean="0"/>
+              <a:t>The ISO standard didn’t help us identify hazards with a go-to method. Instead, this is how we identified our hazards […]. Also, we found a quantification of risks by numbers too restricting, which limited our creativity in risk assessment.</a:t>
             </a:r>
           </a:p>
           <a:p>
             <a:pPr lvl="1"/>
-            <a:r>
-              <a:rPr lang="en-US" dirty="0" smtClean="0"/>
-              <a:t>Bad examples: See bad examples in previous slide.</a:t>
-            </a:r>
-          </a:p>
-          <a:p>
-            <a:r>
-              <a:rPr lang="en-US" dirty="0" smtClean="0"/>
-              <a:t>Every team member should participate in the talk.</a:t>
-            </a:r>
-          </a:p>
-          <a:p>
-            <a:endParaRPr lang="en-US" dirty="0" smtClean="0"/>
-          </a:p>
-          <a:p>
+            <a:endParaRPr lang="en-CA" altLang="fr-FR" dirty="0" smtClean="0"/>
+          </a:p>
+          <a:p>
+            <a:pPr lvl="1"/>
             <a:endParaRPr lang="en-US" dirty="0"/>
           </a:p>
         </p:txBody>
@@ -4663,7 +4697,7 @@
     </p:spTree>
     <p:extLst>
       <p:ext uri="{BB962C8B-B14F-4D97-AF65-F5344CB8AC3E}">
-        <p14:creationId xmlns:p14="http://schemas.microsoft.com/office/powerpoint/2010/main" val="1900175594"/>
+        <p14:creationId xmlns:p14="http://schemas.microsoft.com/office/powerpoint/2010/main" val="2039403683"/>
       </p:ext>
     </p:extLst>
   </p:cSld>

</xml_diff>